<commit_message>
models kense pres4 pre-final ups
</commit_message>
<xml_diff>
--- a/models/presentation4_CSmodeling.pptx
+++ b/models/presentation4_CSmodeling.pptx
@@ -709,7 +709,7 @@
           <a:p>
             <a:fld id="{D4A2563E-A08D-469B-B07B-FA0E4BE6DF5B}" type="datetimeFigureOut">
               <a:rPr lang="en-US" smtClean="0"/>
-              <a:t>15-Apr-20</a:t>
+              <a:t>16-Apr-20</a:t>
             </a:fld>
             <a:endParaRPr lang="en-US"/>
           </a:p>
@@ -907,7 +907,7 @@
           <a:p>
             <a:fld id="{D4A2563E-A08D-469B-B07B-FA0E4BE6DF5B}" type="datetimeFigureOut">
               <a:rPr lang="en-US" smtClean="0"/>
-              <a:t>15-Apr-20</a:t>
+              <a:t>16-Apr-20</a:t>
             </a:fld>
             <a:endParaRPr lang="en-US"/>
           </a:p>
@@ -1115,7 +1115,7 @@
           <a:p>
             <a:fld id="{D4A2563E-A08D-469B-B07B-FA0E4BE6DF5B}" type="datetimeFigureOut">
               <a:rPr lang="en-US" smtClean="0"/>
-              <a:t>15-Apr-20</a:t>
+              <a:t>16-Apr-20</a:t>
             </a:fld>
             <a:endParaRPr lang="en-US"/>
           </a:p>
@@ -1313,7 +1313,7 @@
           <a:p>
             <a:fld id="{D4A2563E-A08D-469B-B07B-FA0E4BE6DF5B}" type="datetimeFigureOut">
               <a:rPr lang="en-US" smtClean="0"/>
-              <a:t>15-Apr-20</a:t>
+              <a:t>16-Apr-20</a:t>
             </a:fld>
             <a:endParaRPr lang="en-US"/>
           </a:p>
@@ -1588,7 +1588,7 @@
           <a:p>
             <a:fld id="{D4A2563E-A08D-469B-B07B-FA0E4BE6DF5B}" type="datetimeFigureOut">
               <a:rPr lang="en-US" smtClean="0"/>
-              <a:t>15-Apr-20</a:t>
+              <a:t>16-Apr-20</a:t>
             </a:fld>
             <a:endParaRPr lang="en-US"/>
           </a:p>
@@ -1853,7 +1853,7 @@
           <a:p>
             <a:fld id="{D4A2563E-A08D-469B-B07B-FA0E4BE6DF5B}" type="datetimeFigureOut">
               <a:rPr lang="en-US" smtClean="0"/>
-              <a:t>15-Apr-20</a:t>
+              <a:t>16-Apr-20</a:t>
             </a:fld>
             <a:endParaRPr lang="en-US"/>
           </a:p>
@@ -2265,7 +2265,7 @@
           <a:p>
             <a:fld id="{D4A2563E-A08D-469B-B07B-FA0E4BE6DF5B}" type="datetimeFigureOut">
               <a:rPr lang="en-US" smtClean="0"/>
-              <a:t>15-Apr-20</a:t>
+              <a:t>16-Apr-20</a:t>
             </a:fld>
             <a:endParaRPr lang="en-US"/>
           </a:p>
@@ -2406,7 +2406,7 @@
           <a:p>
             <a:fld id="{D4A2563E-A08D-469B-B07B-FA0E4BE6DF5B}" type="datetimeFigureOut">
               <a:rPr lang="en-US" smtClean="0"/>
-              <a:t>15-Apr-20</a:t>
+              <a:t>16-Apr-20</a:t>
             </a:fld>
             <a:endParaRPr lang="en-US"/>
           </a:p>
@@ -2519,7 +2519,7 @@
           <a:p>
             <a:fld id="{D4A2563E-A08D-469B-B07B-FA0E4BE6DF5B}" type="datetimeFigureOut">
               <a:rPr lang="en-US" smtClean="0"/>
-              <a:t>15-Apr-20</a:t>
+              <a:t>16-Apr-20</a:t>
             </a:fld>
             <a:endParaRPr lang="en-US"/>
           </a:p>
@@ -2830,7 +2830,7 @@
           <a:p>
             <a:fld id="{D4A2563E-A08D-469B-B07B-FA0E4BE6DF5B}" type="datetimeFigureOut">
               <a:rPr lang="en-US" smtClean="0"/>
-              <a:t>15-Apr-20</a:t>
+              <a:t>16-Apr-20</a:t>
             </a:fld>
             <a:endParaRPr lang="en-US"/>
           </a:p>
@@ -3118,7 +3118,7 @@
           <a:p>
             <a:fld id="{D4A2563E-A08D-469B-B07B-FA0E4BE6DF5B}" type="datetimeFigureOut">
               <a:rPr lang="en-US" smtClean="0"/>
-              <a:t>15-Apr-20</a:t>
+              <a:t>16-Apr-20</a:t>
             </a:fld>
             <a:endParaRPr lang="en-US"/>
           </a:p>
@@ -3359,7 +3359,7 @@
           <a:p>
             <a:fld id="{D4A2563E-A08D-469B-B07B-FA0E4BE6DF5B}" type="datetimeFigureOut">
               <a:rPr lang="en-US" smtClean="0"/>
-              <a:t>15-Apr-20</a:t>
+              <a:t>16-Apr-20</a:t>
             </a:fld>
             <a:endParaRPr lang="en-US"/>
           </a:p>
@@ -4841,8 +4841,44 @@
         </p:blipFill>
         <p:spPr>
           <a:xfrm>
-            <a:off x="6096000" y="-320992"/>
+            <a:off x="6156960" y="-320992"/>
             <a:ext cx="5364480" cy="4023360"/>
+          </a:xfrm>
+          <a:prstGeom prst="rect">
+            <a:avLst/>
+          </a:prstGeom>
+        </p:spPr>
+      </p:pic>
+      <p:pic>
+        <p:nvPicPr>
+          <p:cNvPr id="9" name="Picture 8">
+            <a:extLst>
+              <a:ext uri="{FF2B5EF4-FFF2-40B4-BE49-F238E27FC236}">
+                <a16:creationId xmlns:a16="http://schemas.microsoft.com/office/drawing/2014/main" id="{7BEA9135-86D0-4713-AFF7-B9C9372510EB}"/>
+              </a:ext>
+            </a:extLst>
+          </p:cNvPr>
+          <p:cNvPicPr>
+            <a:picLocks noChangeAspect="1"/>
+          </p:cNvPicPr>
+          <p:nvPr/>
+        </p:nvPicPr>
+        <p:blipFill>
+          <a:blip r:embed="rId3">
+            <a:extLst>
+              <a:ext uri="{28A0092B-C50C-407E-A947-70E740481C1C}">
+                <a14:useLocalDpi xmlns:a14="http://schemas.microsoft.com/office/drawing/2010/main" val="0"/>
+              </a:ext>
+            </a:extLst>
+          </a:blip>
+          <a:stretch>
+            <a:fillRect/>
+          </a:stretch>
+        </p:blipFill>
+        <p:spPr>
+          <a:xfrm>
+            <a:off x="5643154" y="2743200"/>
+            <a:ext cx="6548846" cy="4911634"/>
           </a:xfrm>
           <a:prstGeom prst="rect">
             <a:avLst/>

</xml_diff>

<commit_message>
models pres 4 ups
</commit_message>
<xml_diff>
--- a/models/presentation4_CSmodeling.pptx
+++ b/models/presentation4_CSmodeling.pptx
@@ -5,7 +5,7 @@
     <p:sldMasterId id="2147483648" r:id="rId1"/>
   </p:sldMasterIdLst>
   <p:notesMasterIdLst>
-    <p:notesMasterId r:id="rId14"/>
+    <p:notesMasterId r:id="rId15"/>
   </p:notesMasterIdLst>
   <p:sldIdLst>
     <p:sldId id="256" r:id="rId2"/>
@@ -15,11 +15,12 @@
     <p:sldId id="258" r:id="rId6"/>
     <p:sldId id="259" r:id="rId7"/>
     <p:sldId id="262" r:id="rId8"/>
-    <p:sldId id="263" r:id="rId9"/>
-    <p:sldId id="264" r:id="rId10"/>
-    <p:sldId id="261" r:id="rId11"/>
-    <p:sldId id="265" r:id="rId12"/>
-    <p:sldId id="267" r:id="rId13"/>
+    <p:sldId id="270" r:id="rId9"/>
+    <p:sldId id="263" r:id="rId10"/>
+    <p:sldId id="264" r:id="rId11"/>
+    <p:sldId id="261" r:id="rId12"/>
+    <p:sldId id="265" r:id="rId13"/>
+    <p:sldId id="267" r:id="rId14"/>
   </p:sldIdLst>
   <p:sldSz cx="12192000" cy="6858000"/>
   <p:notesSz cx="6858000" cy="9144000"/>
@@ -126,6 +127,18 @@
 </p:presentation>
 </file>
 
+<file path=ppt/commentAuthors.xml><?xml version="1.0" encoding="utf-8"?>
+<p:cmAuthorLst xmlns:a="http://schemas.openxmlformats.org/drawingml/2006/main" xmlns:r="http://schemas.openxmlformats.org/officeDocument/2006/relationships" xmlns:p="http://schemas.openxmlformats.org/presentationml/2006/main">
+  <p:cmAuthor id="1" name="Kense Ning" initials="KN" lastIdx="1" clrIdx="0">
+    <p:extLst>
+      <p:ext uri="{19B8F6BF-5375-455C-9EA6-DF929625EA0E}">
+        <p15:presenceInfo xmlns:p15="http://schemas.microsoft.com/office/powerpoint/2012/main" userId="dd7d35608bfe93b2" providerId="Windows Live"/>
+      </p:ext>
+    </p:extLst>
+  </p:cmAuthor>
+</p:cmAuthorLst>
+</file>
+
 <file path=ppt/notesMasters/notesMaster1.xml><?xml version="1.0" encoding="utf-8"?>
 <p:notesMaster xmlns:a="http://schemas.openxmlformats.org/drawingml/2006/main" xmlns:r="http://schemas.openxmlformats.org/officeDocument/2006/relationships" xmlns:p="http://schemas.openxmlformats.org/presentationml/2006/main">
   <p:cSld>
@@ -208,7 +221,7 @@
           <a:p>
             <a:fld id="{9774080B-04D1-41C3-86CC-C91B062C478E}" type="datetimeFigureOut">
               <a:rPr lang="en-US" smtClean="0"/>
-              <a:t>16-Apr-20</a:t>
+              <a:t>17-Apr-20</a:t>
             </a:fld>
             <a:endParaRPr lang="en-US"/>
           </a:p>
@@ -709,7 +722,7 @@
           <a:p>
             <a:fld id="{D4A2563E-A08D-469B-B07B-FA0E4BE6DF5B}" type="datetimeFigureOut">
               <a:rPr lang="en-US" smtClean="0"/>
-              <a:t>16-Apr-20</a:t>
+              <a:t>17-Apr-20</a:t>
             </a:fld>
             <a:endParaRPr lang="en-US"/>
           </a:p>
@@ -907,7 +920,7 @@
           <a:p>
             <a:fld id="{D4A2563E-A08D-469B-B07B-FA0E4BE6DF5B}" type="datetimeFigureOut">
               <a:rPr lang="en-US" smtClean="0"/>
-              <a:t>16-Apr-20</a:t>
+              <a:t>17-Apr-20</a:t>
             </a:fld>
             <a:endParaRPr lang="en-US"/>
           </a:p>
@@ -1115,7 +1128,7 @@
           <a:p>
             <a:fld id="{D4A2563E-A08D-469B-B07B-FA0E4BE6DF5B}" type="datetimeFigureOut">
               <a:rPr lang="en-US" smtClean="0"/>
-              <a:t>16-Apr-20</a:t>
+              <a:t>17-Apr-20</a:t>
             </a:fld>
             <a:endParaRPr lang="en-US"/>
           </a:p>
@@ -1313,7 +1326,7 @@
           <a:p>
             <a:fld id="{D4A2563E-A08D-469B-B07B-FA0E4BE6DF5B}" type="datetimeFigureOut">
               <a:rPr lang="en-US" smtClean="0"/>
-              <a:t>16-Apr-20</a:t>
+              <a:t>17-Apr-20</a:t>
             </a:fld>
             <a:endParaRPr lang="en-US"/>
           </a:p>
@@ -1588,7 +1601,7 @@
           <a:p>
             <a:fld id="{D4A2563E-A08D-469B-B07B-FA0E4BE6DF5B}" type="datetimeFigureOut">
               <a:rPr lang="en-US" smtClean="0"/>
-              <a:t>16-Apr-20</a:t>
+              <a:t>17-Apr-20</a:t>
             </a:fld>
             <a:endParaRPr lang="en-US"/>
           </a:p>
@@ -1853,7 +1866,7 @@
           <a:p>
             <a:fld id="{D4A2563E-A08D-469B-B07B-FA0E4BE6DF5B}" type="datetimeFigureOut">
               <a:rPr lang="en-US" smtClean="0"/>
-              <a:t>16-Apr-20</a:t>
+              <a:t>17-Apr-20</a:t>
             </a:fld>
             <a:endParaRPr lang="en-US"/>
           </a:p>
@@ -2265,7 +2278,7 @@
           <a:p>
             <a:fld id="{D4A2563E-A08D-469B-B07B-FA0E4BE6DF5B}" type="datetimeFigureOut">
               <a:rPr lang="en-US" smtClean="0"/>
-              <a:t>16-Apr-20</a:t>
+              <a:t>17-Apr-20</a:t>
             </a:fld>
             <a:endParaRPr lang="en-US"/>
           </a:p>
@@ -2406,7 +2419,7 @@
           <a:p>
             <a:fld id="{D4A2563E-A08D-469B-B07B-FA0E4BE6DF5B}" type="datetimeFigureOut">
               <a:rPr lang="en-US" smtClean="0"/>
-              <a:t>16-Apr-20</a:t>
+              <a:t>17-Apr-20</a:t>
             </a:fld>
             <a:endParaRPr lang="en-US"/>
           </a:p>
@@ -2519,7 +2532,7 @@
           <a:p>
             <a:fld id="{D4A2563E-A08D-469B-B07B-FA0E4BE6DF5B}" type="datetimeFigureOut">
               <a:rPr lang="en-US" smtClean="0"/>
-              <a:t>16-Apr-20</a:t>
+              <a:t>17-Apr-20</a:t>
             </a:fld>
             <a:endParaRPr lang="en-US"/>
           </a:p>
@@ -2830,7 +2843,7 @@
           <a:p>
             <a:fld id="{D4A2563E-A08D-469B-B07B-FA0E4BE6DF5B}" type="datetimeFigureOut">
               <a:rPr lang="en-US" smtClean="0"/>
-              <a:t>16-Apr-20</a:t>
+              <a:t>17-Apr-20</a:t>
             </a:fld>
             <a:endParaRPr lang="en-US"/>
           </a:p>
@@ -3118,7 +3131,7 @@
           <a:p>
             <a:fld id="{D4A2563E-A08D-469B-B07B-FA0E4BE6DF5B}" type="datetimeFigureOut">
               <a:rPr lang="en-US" smtClean="0"/>
-              <a:t>16-Apr-20</a:t>
+              <a:t>17-Apr-20</a:t>
             </a:fld>
             <a:endParaRPr lang="en-US"/>
           </a:p>
@@ -3359,7 +3372,7 @@
           <a:p>
             <a:fld id="{D4A2563E-A08D-469B-B07B-FA0E4BE6DF5B}" type="datetimeFigureOut">
               <a:rPr lang="en-US" smtClean="0"/>
-              <a:t>16-Apr-20</a:t>
+              <a:t>17-Apr-20</a:t>
             </a:fld>
             <a:endParaRPr lang="en-US"/>
           </a:p>
@@ -3892,6 +3905,99 @@
           <a:chExt cx="0" cy="0"/>
         </a:xfrm>
       </p:grpSpPr>
+      <p:sp>
+        <p:nvSpPr>
+          <p:cNvPr id="2" name="Title 1">
+            <a:extLst>
+              <a:ext uri="{FF2B5EF4-FFF2-40B4-BE49-F238E27FC236}">
+                <a16:creationId xmlns:a16="http://schemas.microsoft.com/office/drawing/2014/main" id="{C2119868-8844-4938-8AF1-8194D29B87DE}"/>
+              </a:ext>
+            </a:extLst>
+          </p:cNvPr>
+          <p:cNvSpPr>
+            <a:spLocks noGrp="1"/>
+          </p:cNvSpPr>
+          <p:nvPr>
+            <p:ph type="title"/>
+          </p:nvPr>
+        </p:nvSpPr>
+        <p:spPr/>
+        <p:txBody>
+          <a:bodyPr/>
+          <a:lstStyle/>
+          <a:p>
+            <a:r>
+              <a:rPr lang="en-US" dirty="0"/>
+              <a:t>P2</a:t>
+            </a:r>
+          </a:p>
+        </p:txBody>
+      </p:sp>
+      <p:pic>
+        <p:nvPicPr>
+          <p:cNvPr id="5" name="Content Placeholder 4">
+            <a:extLst>
+              <a:ext uri="{FF2B5EF4-FFF2-40B4-BE49-F238E27FC236}">
+                <a16:creationId xmlns:a16="http://schemas.microsoft.com/office/drawing/2014/main" id="{3F9B67D4-5407-4EE1-AB5A-9E3AAA5147F7}"/>
+              </a:ext>
+            </a:extLst>
+          </p:cNvPr>
+          <p:cNvPicPr>
+            <a:picLocks noGrp="1" noChangeAspect="1"/>
+          </p:cNvPicPr>
+          <p:nvPr>
+            <p:ph idx="1"/>
+          </p:nvPr>
+        </p:nvPicPr>
+        <p:blipFill>
+          <a:blip r:embed="rId2">
+            <a:extLst>
+              <a:ext uri="{28A0092B-C50C-407E-A947-70E740481C1C}">
+                <a14:useLocalDpi xmlns:a14="http://schemas.microsoft.com/office/drawing/2010/main" val="0"/>
+              </a:ext>
+            </a:extLst>
+          </a:blip>
+          <a:stretch>
+            <a:fillRect/>
+          </a:stretch>
+        </p:blipFill>
+        <p:spPr>
+          <a:xfrm>
+            <a:off x="1524000" y="0"/>
+            <a:ext cx="9144000" cy="6858000"/>
+          </a:xfrm>
+        </p:spPr>
+      </p:pic>
+    </p:spTree>
+    <p:extLst>
+      <p:ext uri="{BB962C8B-B14F-4D97-AF65-F5344CB8AC3E}">
+        <p14:creationId xmlns:p14="http://schemas.microsoft.com/office/powerpoint/2010/main" val="629327320"/>
+      </p:ext>
+    </p:extLst>
+  </p:cSld>
+  <p:clrMapOvr>
+    <a:masterClrMapping/>
+  </p:clrMapOvr>
+</p:sld>
+</file>
+
+<file path=ppt/slides/slide11.xml><?xml version="1.0" encoding="utf-8"?>
+<p:sld xmlns:a="http://schemas.openxmlformats.org/drawingml/2006/main" xmlns:r="http://schemas.openxmlformats.org/officeDocument/2006/relationships" xmlns:p="http://schemas.openxmlformats.org/presentationml/2006/main">
+  <p:cSld>
+    <p:spTree>
+      <p:nvGrpSpPr>
+        <p:cNvPr id="1" name=""/>
+        <p:cNvGrpSpPr/>
+        <p:nvPr/>
+      </p:nvGrpSpPr>
+      <p:grpSpPr>
+        <a:xfrm>
+          <a:off x="0" y="0"/>
+          <a:ext cx="0" cy="0"/>
+          <a:chOff x="0" y="0"/>
+          <a:chExt cx="0" cy="0"/>
+        </a:xfrm>
+      </p:grpSpPr>
       <p:pic>
         <p:nvPicPr>
           <p:cNvPr id="6" name="Content Placeholder 5">
@@ -3968,7 +4074,7 @@
 </p:sld>
 </file>
 
-<file path=ppt/slides/slide11.xml><?xml version="1.0" encoding="utf-8"?>
+<file path=ppt/slides/slide12.xml><?xml version="1.0" encoding="utf-8"?>
 <p:sld xmlns:a="http://schemas.openxmlformats.org/drawingml/2006/main" xmlns:r="http://schemas.openxmlformats.org/officeDocument/2006/relationships" xmlns:p="http://schemas.openxmlformats.org/presentationml/2006/main">
   <p:cSld>
     <p:spTree>
@@ -4098,7 +4204,7 @@
 </p:sld>
 </file>
 
-<file path=ppt/slides/slide12.xml><?xml version="1.0" encoding="utf-8"?>
+<file path=ppt/slides/slide13.xml><?xml version="1.0" encoding="utf-8"?>
 <p:sld xmlns:a="http://schemas.openxmlformats.org/drawingml/2006/main" xmlns:r="http://schemas.openxmlformats.org/officeDocument/2006/relationships" xmlns:p="http://schemas.openxmlformats.org/presentationml/2006/main">
   <p:cSld>
     <p:spTree>
@@ -4805,12 +4911,6 @@
               <a:t>’: 0, … }</a:t>
             </a:r>
           </a:p>
-          <a:p>
-            <a:r>
-              <a:rPr lang="en-US" dirty="0"/>
-              <a:t>Creating causalities</a:t>
-            </a:r>
-          </a:p>
         </p:txBody>
       </p:sp>
       <p:pic>
@@ -4841,44 +4941,8 @@
         </p:blipFill>
         <p:spPr>
           <a:xfrm>
-            <a:off x="6156960" y="-320992"/>
+            <a:off x="5989320" y="-704168"/>
             <a:ext cx="5364480" cy="4023360"/>
-          </a:xfrm>
-          <a:prstGeom prst="rect">
-            <a:avLst/>
-          </a:prstGeom>
-        </p:spPr>
-      </p:pic>
-      <p:pic>
-        <p:nvPicPr>
-          <p:cNvPr id="9" name="Picture 8">
-            <a:extLst>
-              <a:ext uri="{FF2B5EF4-FFF2-40B4-BE49-F238E27FC236}">
-                <a16:creationId xmlns:a16="http://schemas.microsoft.com/office/drawing/2014/main" id="{7BEA9135-86D0-4713-AFF7-B9C9372510EB}"/>
-              </a:ext>
-            </a:extLst>
-          </p:cNvPr>
-          <p:cNvPicPr>
-            <a:picLocks noChangeAspect="1"/>
-          </p:cNvPicPr>
-          <p:nvPr/>
-        </p:nvPicPr>
-        <p:blipFill>
-          <a:blip r:embed="rId3">
-            <a:extLst>
-              <a:ext uri="{28A0092B-C50C-407E-A947-70E740481C1C}">
-                <a14:useLocalDpi xmlns:a14="http://schemas.microsoft.com/office/drawing/2010/main" val="0"/>
-              </a:ext>
-            </a:extLst>
-          </a:blip>
-          <a:stretch>
-            <a:fillRect/>
-          </a:stretch>
-        </p:blipFill>
-        <p:spPr>
-          <a:xfrm>
-            <a:off x="5643154" y="2743200"/>
-            <a:ext cx="6548846" cy="4911634"/>
           </a:xfrm>
           <a:prstGeom prst="rect">
             <a:avLst/>
@@ -4920,7 +4984,7 @@
           <p:cNvPr id="2" name="Title 1">
             <a:extLst>
               <a:ext uri="{FF2B5EF4-FFF2-40B4-BE49-F238E27FC236}">
-                <a16:creationId xmlns:a16="http://schemas.microsoft.com/office/drawing/2014/main" id="{088E54E6-CC11-47CE-87B0-BAE21A46806D}"/>
+                <a16:creationId xmlns:a16="http://schemas.microsoft.com/office/drawing/2014/main" id="{C921EF63-313B-424A-9536-2D1AA0321973}"/>
               </a:ext>
             </a:extLst>
           </p:cNvPr>
@@ -4938,26 +5002,95 @@
           <a:p>
             <a:r>
               <a:rPr lang="en-US" dirty="0"/>
-              <a:t>P1</a:t>
+              <a:t>Process Discovery </a:t>
+            </a:r>
+          </a:p>
+        </p:txBody>
+      </p:sp>
+      <p:sp>
+        <p:nvSpPr>
+          <p:cNvPr id="3" name="Content Placeholder 2">
+            <a:extLst>
+              <a:ext uri="{FF2B5EF4-FFF2-40B4-BE49-F238E27FC236}">
+                <a16:creationId xmlns:a16="http://schemas.microsoft.com/office/drawing/2014/main" id="{AFF3983C-F73E-4BFB-9775-5D16B496FEC8}"/>
+              </a:ext>
+            </a:extLst>
+          </p:cNvPr>
+          <p:cNvSpPr>
+            <a:spLocks noGrp="1"/>
+          </p:cNvSpPr>
+          <p:nvPr>
+            <p:ph idx="1"/>
+          </p:nvPr>
+        </p:nvSpPr>
+        <p:spPr/>
+        <p:txBody>
+          <a:bodyPr/>
+          <a:lstStyle/>
+          <a:p>
+            <a:r>
+              <a:rPr lang="en-US" dirty="0"/>
+              <a:t>P1/P2 Independence Assumptions</a:t>
+            </a:r>
+          </a:p>
+          <a:p>
+            <a:r>
+              <a:rPr lang="en-US" dirty="0"/>
+              <a:t>Creating traces</a:t>
+            </a:r>
+          </a:p>
+          <a:p>
+            <a:r>
+              <a:rPr lang="en-US" dirty="0"/>
+              <a:t>Dictionaries of dependencies</a:t>
+            </a:r>
+          </a:p>
+          <a:p>
+            <a:pPr lvl="1"/>
+            <a:r>
+              <a:rPr lang="en-US" dirty="0"/>
+              <a:t>‘</a:t>
+            </a:r>
+            <a:r>
+              <a:rPr lang="en-US" dirty="0" err="1"/>
+              <a:t>check.reception</a:t>
+            </a:r>
+            <a:r>
+              <a:rPr lang="en-US" dirty="0"/>
+              <a:t>’: {‘</a:t>
+            </a:r>
+            <a:r>
+              <a:rPr lang="en-US" dirty="0" err="1"/>
+              <a:t>relax.atmosphere</a:t>
+            </a:r>
+            <a:r>
+              <a:rPr lang="en-US" dirty="0"/>
+              <a:t>’: 1, ‘</a:t>
+            </a:r>
+            <a:r>
+              <a:rPr lang="en-US" dirty="0" err="1"/>
+              <a:t>manage.task</a:t>
+            </a:r>
+            <a:r>
+              <a:rPr lang="en-US" dirty="0"/>
+              <a:t>’: 0, … }</a:t>
             </a:r>
           </a:p>
         </p:txBody>
       </p:sp>
       <p:pic>
         <p:nvPicPr>
-          <p:cNvPr id="5" name="Content Placeholder 4">
-            <a:extLst>
-              <a:ext uri="{FF2B5EF4-FFF2-40B4-BE49-F238E27FC236}">
-                <a16:creationId xmlns:a16="http://schemas.microsoft.com/office/drawing/2014/main" id="{DB8500AB-4E76-4DB2-8421-B062C1803A28}"/>
+          <p:cNvPr id="7" name="Picture 6">
+            <a:extLst>
+              <a:ext uri="{FF2B5EF4-FFF2-40B4-BE49-F238E27FC236}">
+                <a16:creationId xmlns:a16="http://schemas.microsoft.com/office/drawing/2014/main" id="{CD6606A1-DF36-4EDB-9185-D70ACA594483}"/>
               </a:ext>
             </a:extLst>
           </p:cNvPr>
           <p:cNvPicPr>
-            <a:picLocks noGrp="1" noChangeAspect="1"/>
+            <a:picLocks noChangeAspect="1"/>
           </p:cNvPicPr>
-          <p:nvPr>
-            <p:ph idx="1"/>
-          </p:nvPr>
+          <p:nvPr/>
         </p:nvPicPr>
         <p:blipFill>
           <a:blip r:embed="rId2">
@@ -4973,15 +5106,54 @@
         </p:blipFill>
         <p:spPr>
           <a:xfrm>
-            <a:off x="1524000" y="0"/>
-            <a:ext cx="9144000" cy="6858000"/>
+            <a:off x="5989320" y="-704168"/>
+            <a:ext cx="5364480" cy="4023360"/>
           </a:xfrm>
+          <a:prstGeom prst="rect">
+            <a:avLst/>
+          </a:prstGeom>
+        </p:spPr>
+      </p:pic>
+      <p:pic>
+        <p:nvPicPr>
+          <p:cNvPr id="9" name="Picture 8">
+            <a:extLst>
+              <a:ext uri="{FF2B5EF4-FFF2-40B4-BE49-F238E27FC236}">
+                <a16:creationId xmlns:a16="http://schemas.microsoft.com/office/drawing/2014/main" id="{7BEA9135-86D0-4713-AFF7-B9C9372510EB}"/>
+              </a:ext>
+            </a:extLst>
+          </p:cNvPr>
+          <p:cNvPicPr>
+            <a:picLocks noChangeAspect="1"/>
+          </p:cNvPicPr>
+          <p:nvPr/>
+        </p:nvPicPr>
+        <p:blipFill>
+          <a:blip r:embed="rId3">
+            <a:extLst>
+              <a:ext uri="{28A0092B-C50C-407E-A947-70E740481C1C}">
+                <a14:useLocalDpi xmlns:a14="http://schemas.microsoft.com/office/drawing/2010/main" val="0"/>
+              </a:ext>
+            </a:extLst>
+          </a:blip>
+          <a:stretch>
+            <a:fillRect/>
+          </a:stretch>
+        </p:blipFill>
+        <p:spPr>
+          <a:xfrm>
+            <a:off x="2821577" y="2682240"/>
+            <a:ext cx="6548846" cy="4911634"/>
+          </a:xfrm>
+          <a:prstGeom prst="rect">
+            <a:avLst/>
+          </a:prstGeom>
         </p:spPr>
       </p:pic>
     </p:spTree>
     <p:extLst>
       <p:ext uri="{BB962C8B-B14F-4D97-AF65-F5344CB8AC3E}">
-        <p14:creationId xmlns:p14="http://schemas.microsoft.com/office/powerpoint/2010/main" val="4171697198"/>
+        <p14:creationId xmlns:p14="http://schemas.microsoft.com/office/powerpoint/2010/main" val="92042646"/>
       </p:ext>
     </p:extLst>
   </p:cSld>
@@ -5013,7 +5185,7 @@
           <p:cNvPr id="2" name="Title 1">
             <a:extLst>
               <a:ext uri="{FF2B5EF4-FFF2-40B4-BE49-F238E27FC236}">
-                <a16:creationId xmlns:a16="http://schemas.microsoft.com/office/drawing/2014/main" id="{C2119868-8844-4938-8AF1-8194D29B87DE}"/>
+                <a16:creationId xmlns:a16="http://schemas.microsoft.com/office/drawing/2014/main" id="{088E54E6-CC11-47CE-87B0-BAE21A46806D}"/>
               </a:ext>
             </a:extLst>
           </p:cNvPr>
@@ -5031,7 +5203,7 @@
           <a:p>
             <a:r>
               <a:rPr lang="en-US" dirty="0"/>
-              <a:t>P2</a:t>
+              <a:t>P1</a:t>
             </a:r>
           </a:p>
         </p:txBody>
@@ -5041,7 +5213,7 @@
           <p:cNvPr id="5" name="Content Placeholder 4">
             <a:extLst>
               <a:ext uri="{FF2B5EF4-FFF2-40B4-BE49-F238E27FC236}">
-                <a16:creationId xmlns:a16="http://schemas.microsoft.com/office/drawing/2014/main" id="{3F9B67D4-5407-4EE1-AB5A-9E3AAA5147F7}"/>
+                <a16:creationId xmlns:a16="http://schemas.microsoft.com/office/drawing/2014/main" id="{DB8500AB-4E76-4DB2-8421-B062C1803A28}"/>
               </a:ext>
             </a:extLst>
           </p:cNvPr>
@@ -5074,7 +5246,7 @@
     </p:spTree>
     <p:extLst>
       <p:ext uri="{BB962C8B-B14F-4D97-AF65-F5344CB8AC3E}">
-        <p14:creationId xmlns:p14="http://schemas.microsoft.com/office/powerpoint/2010/main" val="629327320"/>
+        <p14:creationId xmlns:p14="http://schemas.microsoft.com/office/powerpoint/2010/main" val="4171697198"/>
       </p:ext>
     </p:extLst>
   </p:cSld>

</xml_diff>